<commit_message>
beatified Thread Pool Spilling slide, removed unnecessary code from Async Decompiled example
</commit_message>
<xml_diff>
--- a/ADC Core 2017 - Multithreading and Async Operations in ASP.NET Core.pptx
+++ b/ADC Core 2017 - Multithreading and Async Operations in ASP.NET Core.pptx
@@ -202,6 +202,10 @@
 </p:presentation>
 </file>
 
+<file path=ppt/revisionInfo.xml><?xml version="1.0" encoding="utf-8"?>
+<p1510:revInfo xmlns:a="http://schemas.openxmlformats.org/drawingml/2006/main" xmlns:r="http://schemas.openxmlformats.org/officeDocument/2006/relationships" xmlns:p1510="http://schemas.microsoft.com/office/powerpoint/2015/10/main"/>
+</file>
+
 <file path=ppt/handoutMasters/handoutMaster1.xml><?xml version="1.0" encoding="utf-8"?>
 <p:handoutMaster xmlns:a="http://schemas.openxmlformats.org/drawingml/2006/main" xmlns:r="http://schemas.openxmlformats.org/officeDocument/2006/relationships" xmlns:p="http://schemas.openxmlformats.org/presentationml/2006/main">
   <p:cSld>
@@ -1387,7 +1391,7 @@
           <a:p>
             <a:fld id="{237CE087-4543-4189-BB65-6B91047A5D23}" type="datetimeFigureOut">
               <a:rPr lang="de-DE" smtClean="0"/>
-              <a:t>15.09.2017</a:t>
+              <a:t>18.09.2017</a:t>
             </a:fld>
             <a:endParaRPr lang="de-DE"/>
           </a:p>
@@ -6518,10 +6522,10 @@
           <a:lstStyle/>
           <a:p>
             <a:r>
-              <a:rPr lang="en-US" dirty="0"/>
+              <a:rPr lang="en-US" sz="3600" dirty="0"/>
               <a:t>When we block its threads.</a:t>
             </a:r>
-            <a:endParaRPr lang="de-DE" dirty="0"/>
+            <a:endParaRPr lang="de-DE" sz="3600" dirty="0"/>
           </a:p>
         </p:txBody>
       </p:sp>
@@ -7394,13 +7398,13 @@
   <p:clrMapOvr>
     <a:masterClrMapping/>
   </p:clrMapOvr>
-  <mc:AlternateContent xmlns:mc="http://schemas.openxmlformats.org/markup-compatibility/2006">
-    <mc:Choice xmlns:p159="http://schemas.microsoft.com/office/powerpoint/2015/09/main" Requires="p159">
+  <mc:AlternateContent xmlns:mc="http://schemas.openxmlformats.org/markup-compatibility/2006" xmlns:p159="http://schemas.microsoft.com/office/powerpoint/2015/09/main">
+    <mc:Choice Requires="p159">
       <p:transition xmlns:p14="http://schemas.microsoft.com/office/powerpoint/2010/main" spd="slow" p14:dur="2000">
         <p159:morph option="byObject"/>
       </p:transition>
     </mc:Choice>
-    <mc:Fallback>
+    <mc:Fallback xmlns="">
       <p:transition spd="slow">
         <p:fade/>
       </p:transition>
@@ -7809,13 +7813,13 @@
   <p:clrMapOvr>
     <a:masterClrMapping/>
   </p:clrMapOvr>
-  <mc:AlternateContent xmlns:mc="http://schemas.openxmlformats.org/markup-compatibility/2006">
-    <mc:Choice xmlns:p159="http://schemas.microsoft.com/office/powerpoint/2015/09/main" Requires="p159">
+  <mc:AlternateContent xmlns:mc="http://schemas.openxmlformats.org/markup-compatibility/2006" xmlns:p159="http://schemas.microsoft.com/office/powerpoint/2015/09/main">
+    <mc:Choice Requires="p159">
       <p:transition xmlns:p14="http://schemas.microsoft.com/office/powerpoint/2010/main" spd="slow" p14:dur="2000">
         <p159:morph option="byObject"/>
       </p:transition>
     </mc:Choice>
-    <mc:Fallback>
+    <mc:Fallback xmlns="">
       <p:transition spd="slow">
         <p:fade/>
       </p:transition>
@@ -8267,13 +8271,13 @@
   <p:clrMapOvr>
     <a:masterClrMapping/>
   </p:clrMapOvr>
-  <mc:AlternateContent xmlns:mc="http://schemas.openxmlformats.org/markup-compatibility/2006">
-    <mc:Choice xmlns:p159="http://schemas.microsoft.com/office/powerpoint/2015/09/main" Requires="p159">
+  <mc:AlternateContent xmlns:mc="http://schemas.openxmlformats.org/markup-compatibility/2006" xmlns:p159="http://schemas.microsoft.com/office/powerpoint/2015/09/main">
+    <mc:Choice Requires="p159">
       <p:transition xmlns:p14="http://schemas.microsoft.com/office/powerpoint/2010/main" spd="slow" p14:dur="2000">
         <p159:morph option="byObject"/>
       </p:transition>
     </mc:Choice>
-    <mc:Fallback>
+    <mc:Fallback xmlns="">
       <p:transition spd="slow">
         <p:fade/>
       </p:transition>
@@ -8822,13 +8826,13 @@
   <p:clrMapOvr>
     <a:masterClrMapping/>
   </p:clrMapOvr>
-  <mc:AlternateContent xmlns:mc="http://schemas.openxmlformats.org/markup-compatibility/2006">
-    <mc:Choice xmlns:p159="http://schemas.microsoft.com/office/powerpoint/2015/09/main" Requires="p159">
+  <mc:AlternateContent xmlns:mc="http://schemas.openxmlformats.org/markup-compatibility/2006" xmlns:p159="http://schemas.microsoft.com/office/powerpoint/2015/09/main">
+    <mc:Choice Requires="p159">
       <p:transition xmlns:p14="http://schemas.microsoft.com/office/powerpoint/2010/main" spd="slow" p14:dur="2000">
         <p159:morph option="byObject"/>
       </p:transition>
     </mc:Choice>
-    <mc:Fallback>
+    <mc:Fallback xmlns="">
       <p:transition spd="slow">
         <p:fade/>
       </p:transition>
@@ -9280,13 +9284,13 @@
   <p:clrMapOvr>
     <a:masterClrMapping/>
   </p:clrMapOvr>
-  <mc:AlternateContent xmlns:mc="http://schemas.openxmlformats.org/markup-compatibility/2006">
-    <mc:Choice xmlns:p159="http://schemas.microsoft.com/office/powerpoint/2015/09/main" Requires="p159">
+  <mc:AlternateContent xmlns:mc="http://schemas.openxmlformats.org/markup-compatibility/2006" xmlns:p159="http://schemas.microsoft.com/office/powerpoint/2015/09/main">
+    <mc:Choice Requires="p159">
       <p:transition xmlns:p14="http://schemas.microsoft.com/office/powerpoint/2010/main" spd="slow" p14:dur="2000">
         <p159:morph option="byObject"/>
       </p:transition>
     </mc:Choice>
-    <mc:Fallback>
+    <mc:Fallback xmlns="">
       <p:transition spd="slow">
         <p:fade/>
       </p:transition>
@@ -9695,13 +9699,13 @@
   <p:clrMapOvr>
     <a:masterClrMapping/>
   </p:clrMapOvr>
-  <mc:AlternateContent xmlns:mc="http://schemas.openxmlformats.org/markup-compatibility/2006">
-    <mc:Choice xmlns:p159="http://schemas.microsoft.com/office/powerpoint/2015/09/main" Requires="p159">
+  <mc:AlternateContent xmlns:mc="http://schemas.openxmlformats.org/markup-compatibility/2006" xmlns:p159="http://schemas.microsoft.com/office/powerpoint/2015/09/main">
+    <mc:Choice Requires="p159">
       <p:transition xmlns:p14="http://schemas.microsoft.com/office/powerpoint/2010/main" spd="slow" p14:dur="2000">
         <p159:morph option="byObject"/>
       </p:transition>
     </mc:Choice>
-    <mc:Fallback>
+    <mc:Fallback xmlns="">
       <p:transition spd="slow">
         <p:fade/>
       </p:transition>
@@ -10068,13 +10072,13 @@
   <p:clrMapOvr>
     <a:masterClrMapping/>
   </p:clrMapOvr>
-  <mc:AlternateContent xmlns:mc="http://schemas.openxmlformats.org/markup-compatibility/2006">
-    <mc:Choice xmlns:p159="http://schemas.microsoft.com/office/powerpoint/2015/09/main" Requires="p159">
+  <mc:AlternateContent xmlns:mc="http://schemas.openxmlformats.org/markup-compatibility/2006" xmlns:p159="http://schemas.microsoft.com/office/powerpoint/2015/09/main">
+    <mc:Choice Requires="p159">
       <p:transition xmlns:p14="http://schemas.microsoft.com/office/powerpoint/2010/main" spd="slow" p14:dur="2000">
         <p159:morph option="byObject"/>
       </p:transition>
     </mc:Choice>
-    <mc:Fallback>
+    <mc:Fallback xmlns="">
       <p:transition spd="slow">
         <p:fade/>
       </p:transition>
@@ -10754,13 +10758,13 @@
   <p:clrMapOvr>
     <a:masterClrMapping/>
   </p:clrMapOvr>
-  <mc:AlternateContent xmlns:mc="http://schemas.openxmlformats.org/markup-compatibility/2006">
-    <mc:Choice xmlns:p159="http://schemas.microsoft.com/office/powerpoint/2015/09/main" Requires="p159">
+  <mc:AlternateContent xmlns:mc="http://schemas.openxmlformats.org/markup-compatibility/2006" xmlns:p159="http://schemas.microsoft.com/office/powerpoint/2015/09/main">
+    <mc:Choice Requires="p159">
       <p:transition xmlns:p14="http://schemas.microsoft.com/office/powerpoint/2010/main" spd="slow" p14:dur="2000">
         <p159:morph option="byObject"/>
       </p:transition>
     </mc:Choice>
-    <mc:Fallback>
+    <mc:Fallback xmlns="">
       <p:transition spd="slow">
         <p:fade/>
       </p:transition>
@@ -11260,13 +11264,13 @@
   <p:clrMapOvr>
     <a:masterClrMapping/>
   </p:clrMapOvr>
-  <mc:AlternateContent xmlns:mc="http://schemas.openxmlformats.org/markup-compatibility/2006">
-    <mc:Choice xmlns:p159="http://schemas.microsoft.com/office/powerpoint/2015/09/main" Requires="p159">
+  <mc:AlternateContent xmlns:mc="http://schemas.openxmlformats.org/markup-compatibility/2006" xmlns:p159="http://schemas.microsoft.com/office/powerpoint/2015/09/main">
+    <mc:Choice Requires="p159">
       <p:transition xmlns:p14="http://schemas.microsoft.com/office/powerpoint/2010/main" spd="slow" p14:dur="2000">
         <p159:morph option="byObject"/>
       </p:transition>
     </mc:Choice>
-    <mc:Fallback>
+    <mc:Fallback xmlns="">
       <p:transition spd="slow">
         <p:fade/>
       </p:transition>
@@ -11727,13 +11731,13 @@
   <p:clrMapOvr>
     <a:masterClrMapping/>
   </p:clrMapOvr>
-  <mc:AlternateContent xmlns:mc="http://schemas.openxmlformats.org/markup-compatibility/2006">
-    <mc:Choice xmlns:p159="http://schemas.microsoft.com/office/powerpoint/2015/09/main" Requires="p159">
+  <mc:AlternateContent xmlns:mc="http://schemas.openxmlformats.org/markup-compatibility/2006" xmlns:p159="http://schemas.microsoft.com/office/powerpoint/2015/09/main">
+    <mc:Choice Requires="p159">
       <p:transition xmlns:p14="http://schemas.microsoft.com/office/powerpoint/2010/main" spd="slow" p14:dur="2000">
         <p159:morph option="byObject"/>
       </p:transition>
     </mc:Choice>
-    <mc:Fallback>
+    <mc:Fallback xmlns="">
       <p:transition spd="slow">
         <p:fade/>
       </p:transition>
@@ -12180,13 +12184,13 @@
   <p:clrMapOvr>
     <a:masterClrMapping/>
   </p:clrMapOvr>
-  <mc:AlternateContent xmlns:mc="http://schemas.openxmlformats.org/markup-compatibility/2006">
-    <mc:Choice xmlns:p159="http://schemas.microsoft.com/office/powerpoint/2015/09/main" Requires="p159">
+  <mc:AlternateContent xmlns:mc="http://schemas.openxmlformats.org/markup-compatibility/2006" xmlns:p159="http://schemas.microsoft.com/office/powerpoint/2015/09/main">
+    <mc:Choice Requires="p159">
       <p:transition xmlns:p14="http://schemas.microsoft.com/office/powerpoint/2010/main" spd="slow" p14:dur="2000">
         <p159:morph option="byObject"/>
       </p:transition>
     </mc:Choice>
-    <mc:Fallback>
+    <mc:Fallback xmlns="">
       <p:transition spd="slow">
         <p:fade/>
       </p:transition>
@@ -12553,13 +12557,13 @@
   <p:clrMapOvr>
     <a:masterClrMapping/>
   </p:clrMapOvr>
-  <mc:AlternateContent xmlns:mc="http://schemas.openxmlformats.org/markup-compatibility/2006">
-    <mc:Choice xmlns:p159="http://schemas.microsoft.com/office/powerpoint/2015/09/main" Requires="p159">
+  <mc:AlternateContent xmlns:mc="http://schemas.openxmlformats.org/markup-compatibility/2006" xmlns:p159="http://schemas.microsoft.com/office/powerpoint/2015/09/main">
+    <mc:Choice Requires="p159">
       <p:transition xmlns:p14="http://schemas.microsoft.com/office/powerpoint/2010/main" spd="slow" p14:dur="2000">
         <p159:morph option="byObject"/>
       </p:transition>
     </mc:Choice>
-    <mc:Fallback>
+    <mc:Fallback xmlns="">
       <p:transition spd="slow">
         <p:fade/>
       </p:transition>
@@ -14345,13 +14349,13 @@
   <p:clrMapOvr>
     <a:masterClrMapping/>
   </p:clrMapOvr>
-  <mc:AlternateContent xmlns:mc="http://schemas.openxmlformats.org/markup-compatibility/2006">
-    <mc:Choice xmlns:p159="http://schemas.microsoft.com/office/powerpoint/2015/09/main" Requires="p159">
+  <mc:AlternateContent xmlns:mc="http://schemas.openxmlformats.org/markup-compatibility/2006" xmlns:p159="http://schemas.microsoft.com/office/powerpoint/2015/09/main">
+    <mc:Choice Requires="p159">
       <p:transition xmlns:p14="http://schemas.microsoft.com/office/powerpoint/2010/main" spd="slow" p14:dur="2000">
         <p159:morph option="byObject"/>
       </p:transition>
     </mc:Choice>
-    <mc:Fallback>
+    <mc:Fallback xmlns="">
       <p:transition spd="slow">
         <p:fade/>
       </p:transition>
@@ -14971,13 +14975,13 @@
   <p:clrMapOvr>
     <a:masterClrMapping/>
   </p:clrMapOvr>
-  <mc:AlternateContent xmlns:mc="http://schemas.openxmlformats.org/markup-compatibility/2006">
-    <mc:Choice xmlns:p159="http://schemas.microsoft.com/office/powerpoint/2015/09/main" Requires="p159">
+  <mc:AlternateContent xmlns:mc="http://schemas.openxmlformats.org/markup-compatibility/2006" xmlns:p159="http://schemas.microsoft.com/office/powerpoint/2015/09/main">
+    <mc:Choice Requires="p159">
       <p:transition xmlns:p14="http://schemas.microsoft.com/office/powerpoint/2010/main" spd="slow" p14:dur="2000">
         <p159:morph option="byObject"/>
       </p:transition>
     </mc:Choice>
-    <mc:Fallback>
+    <mc:Fallback xmlns="">
       <p:transition spd="slow">
         <p:fade/>
       </p:transition>
@@ -16015,13 +16019,13 @@
   <p:clrMapOvr>
     <a:masterClrMapping/>
   </p:clrMapOvr>
-  <mc:AlternateContent xmlns:mc="http://schemas.openxmlformats.org/markup-compatibility/2006">
-    <mc:Choice xmlns:p159="http://schemas.microsoft.com/office/powerpoint/2015/09/main" Requires="p159">
+  <mc:AlternateContent xmlns:mc="http://schemas.openxmlformats.org/markup-compatibility/2006" xmlns:p159="http://schemas.microsoft.com/office/powerpoint/2015/09/main">
+    <mc:Choice Requires="p159">
       <p:transition xmlns:p14="http://schemas.microsoft.com/office/powerpoint/2010/main" spd="slow" p14:dur="2000">
         <p159:morph option="byObject"/>
       </p:transition>
     </mc:Choice>
-    <mc:Fallback>
+    <mc:Fallback xmlns="">
       <p:transition spd="slow">
         <p:fade/>
       </p:transition>
@@ -17074,13 +17078,13 @@
   <p:clrMapOvr>
     <a:masterClrMapping/>
   </p:clrMapOvr>
-  <mc:AlternateContent xmlns:mc="http://schemas.openxmlformats.org/markup-compatibility/2006">
-    <mc:Choice xmlns:p159="http://schemas.microsoft.com/office/powerpoint/2015/09/main" Requires="p159">
+  <mc:AlternateContent xmlns:mc="http://schemas.openxmlformats.org/markup-compatibility/2006" xmlns:p159="http://schemas.microsoft.com/office/powerpoint/2015/09/main">
+    <mc:Choice Requires="p159">
       <p:transition xmlns:p14="http://schemas.microsoft.com/office/powerpoint/2010/main" spd="slow" p14:dur="2000">
         <p159:morph option="byObject"/>
       </p:transition>
     </mc:Choice>
-    <mc:Fallback>
+    <mc:Fallback xmlns="">
       <p:transition spd="slow">
         <p:fade/>
       </p:transition>
@@ -18148,13 +18152,13 @@
   <p:clrMapOvr>
     <a:masterClrMapping/>
   </p:clrMapOvr>
-  <mc:AlternateContent xmlns:mc="http://schemas.openxmlformats.org/markup-compatibility/2006">
-    <mc:Choice xmlns:p159="http://schemas.microsoft.com/office/powerpoint/2015/09/main" Requires="p159">
+  <mc:AlternateContent xmlns:mc="http://schemas.openxmlformats.org/markup-compatibility/2006" xmlns:p159="http://schemas.microsoft.com/office/powerpoint/2015/09/main">
+    <mc:Choice Requires="p159">
       <p:transition xmlns:p14="http://schemas.microsoft.com/office/powerpoint/2010/main" spd="slow" p14:dur="2000">
         <p159:morph option="byObject"/>
       </p:transition>
     </mc:Choice>
-    <mc:Fallback>
+    <mc:Fallback xmlns="">
       <p:transition spd="slow">
         <p:fade/>
       </p:transition>
@@ -20106,7 +20110,7 @@
 </file>
 
 <file path=ppt/slides/slide9.xml><?xml version="1.0" encoding="utf-8"?>
-<p:sld xmlns:a="http://schemas.openxmlformats.org/drawingml/2006/main" xmlns:r="http://schemas.openxmlformats.org/officeDocument/2006/relationships" xmlns:p="http://schemas.openxmlformats.org/presentationml/2006/main">
+<p:sld xmlns:a="http://schemas.openxmlformats.org/drawingml/2006/main" xmlns:r="http://schemas.openxmlformats.org/officeDocument/2006/relationships" xmlns:p="http://schemas.openxmlformats.org/presentationml/2006/main" showMasterPhAnim="0">
   <p:cSld>
     <p:spTree>
       <p:nvGrpSpPr>
@@ -20337,6 +20341,222 @@
   <p:transition spd="med">
     <p:pull/>
   </p:transition>
+  <p:timing>
+    <p:tnLst>
+      <p:par>
+        <p:cTn id="1" dur="indefinite" restart="never" nodeType="tmRoot">
+          <p:childTnLst>
+            <p:seq concurrent="1" nextAc="seek">
+              <p:cTn id="2" dur="indefinite" nodeType="mainSeq">
+                <p:childTnLst>
+                  <p:par>
+                    <p:cTn id="3" fill="hold">
+                      <p:stCondLst>
+                        <p:cond delay="indefinite"/>
+                      </p:stCondLst>
+                      <p:childTnLst>
+                        <p:par>
+                          <p:cTn id="4" fill="hold">
+                            <p:stCondLst>
+                              <p:cond delay="0"/>
+                            </p:stCondLst>
+                            <p:childTnLst>
+                              <p:par>
+                                <p:cTn id="5" presetID="10" presetClass="entr" presetSubtype="0" fill="hold" grpId="0" nodeType="clickEffect">
+                                  <p:stCondLst>
+                                    <p:cond delay="0"/>
+                                  </p:stCondLst>
+                                  <p:childTnLst>
+                                    <p:set>
+                                      <p:cBhvr>
+                                        <p:cTn id="6" dur="1" fill="hold">
+                                          <p:stCondLst>
+                                            <p:cond delay="0"/>
+                                          </p:stCondLst>
+                                        </p:cTn>
+                                        <p:tgtEl>
+                                          <p:spTgt spid="7">
+                                            <p:txEl>
+                                              <p:pRg st="0" end="0"/>
+                                            </p:txEl>
+                                          </p:spTgt>
+                                        </p:tgtEl>
+                                        <p:attrNameLst>
+                                          <p:attrName>style.visibility</p:attrName>
+                                        </p:attrNameLst>
+                                      </p:cBhvr>
+                                      <p:to>
+                                        <p:strVal val="visible"/>
+                                      </p:to>
+                                    </p:set>
+                                    <p:animEffect transition="in" filter="fade">
+                                      <p:cBhvr>
+                                        <p:cTn id="7" dur="500"/>
+                                        <p:tgtEl>
+                                          <p:spTgt spid="7">
+                                            <p:txEl>
+                                              <p:pRg st="0" end="0"/>
+                                            </p:txEl>
+                                          </p:spTgt>
+                                        </p:tgtEl>
+                                      </p:cBhvr>
+                                    </p:animEffect>
+                                  </p:childTnLst>
+                                </p:cTn>
+                              </p:par>
+                            </p:childTnLst>
+                          </p:cTn>
+                        </p:par>
+                      </p:childTnLst>
+                    </p:cTn>
+                  </p:par>
+                  <p:par>
+                    <p:cTn id="8" fill="hold">
+                      <p:stCondLst>
+                        <p:cond delay="indefinite"/>
+                      </p:stCondLst>
+                      <p:childTnLst>
+                        <p:par>
+                          <p:cTn id="9" fill="hold">
+                            <p:stCondLst>
+                              <p:cond delay="0"/>
+                            </p:stCondLst>
+                            <p:childTnLst>
+                              <p:par>
+                                <p:cTn id="10" presetID="10" presetClass="entr" presetSubtype="0" fill="hold" grpId="0" nodeType="clickEffect">
+                                  <p:stCondLst>
+                                    <p:cond delay="0"/>
+                                  </p:stCondLst>
+                                  <p:childTnLst>
+                                    <p:set>
+                                      <p:cBhvr>
+                                        <p:cTn id="11" dur="1" fill="hold">
+                                          <p:stCondLst>
+                                            <p:cond delay="0"/>
+                                          </p:stCondLst>
+                                        </p:cTn>
+                                        <p:tgtEl>
+                                          <p:spTgt spid="7">
+                                            <p:txEl>
+                                              <p:pRg st="1" end="1"/>
+                                            </p:txEl>
+                                          </p:spTgt>
+                                        </p:tgtEl>
+                                        <p:attrNameLst>
+                                          <p:attrName>style.visibility</p:attrName>
+                                        </p:attrNameLst>
+                                      </p:cBhvr>
+                                      <p:to>
+                                        <p:strVal val="visible"/>
+                                      </p:to>
+                                    </p:set>
+                                    <p:animEffect transition="in" filter="fade">
+                                      <p:cBhvr>
+                                        <p:cTn id="12" dur="500"/>
+                                        <p:tgtEl>
+                                          <p:spTgt spid="7">
+                                            <p:txEl>
+                                              <p:pRg st="1" end="1"/>
+                                            </p:txEl>
+                                          </p:spTgt>
+                                        </p:tgtEl>
+                                      </p:cBhvr>
+                                    </p:animEffect>
+                                  </p:childTnLst>
+                                </p:cTn>
+                              </p:par>
+                            </p:childTnLst>
+                          </p:cTn>
+                        </p:par>
+                      </p:childTnLst>
+                    </p:cTn>
+                  </p:par>
+                  <p:par>
+                    <p:cTn id="13" fill="hold">
+                      <p:stCondLst>
+                        <p:cond delay="indefinite"/>
+                      </p:stCondLst>
+                      <p:childTnLst>
+                        <p:par>
+                          <p:cTn id="14" fill="hold">
+                            <p:stCondLst>
+                              <p:cond delay="0"/>
+                            </p:stCondLst>
+                            <p:childTnLst>
+                              <p:par>
+                                <p:cTn id="15" presetID="10" presetClass="entr" presetSubtype="0" fill="hold" grpId="0" nodeType="clickEffect">
+                                  <p:stCondLst>
+                                    <p:cond delay="0"/>
+                                  </p:stCondLst>
+                                  <p:childTnLst>
+                                    <p:set>
+                                      <p:cBhvr>
+                                        <p:cTn id="16" dur="1" fill="hold">
+                                          <p:stCondLst>
+                                            <p:cond delay="0"/>
+                                          </p:stCondLst>
+                                        </p:cTn>
+                                        <p:tgtEl>
+                                          <p:spTgt spid="7">
+                                            <p:txEl>
+                                              <p:pRg st="2" end="2"/>
+                                            </p:txEl>
+                                          </p:spTgt>
+                                        </p:tgtEl>
+                                        <p:attrNameLst>
+                                          <p:attrName>style.visibility</p:attrName>
+                                        </p:attrNameLst>
+                                      </p:cBhvr>
+                                      <p:to>
+                                        <p:strVal val="visible"/>
+                                      </p:to>
+                                    </p:set>
+                                    <p:animEffect transition="in" filter="fade">
+                                      <p:cBhvr>
+                                        <p:cTn id="17" dur="500"/>
+                                        <p:tgtEl>
+                                          <p:spTgt spid="7">
+                                            <p:txEl>
+                                              <p:pRg st="2" end="2"/>
+                                            </p:txEl>
+                                          </p:spTgt>
+                                        </p:tgtEl>
+                                      </p:cBhvr>
+                                    </p:animEffect>
+                                  </p:childTnLst>
+                                </p:cTn>
+                              </p:par>
+                            </p:childTnLst>
+                          </p:cTn>
+                        </p:par>
+                      </p:childTnLst>
+                    </p:cTn>
+                  </p:par>
+                </p:childTnLst>
+              </p:cTn>
+              <p:prevCondLst>
+                <p:cond evt="onPrev" delay="0">
+                  <p:tgtEl>
+                    <p:sldTgt/>
+                  </p:tgtEl>
+                </p:cond>
+              </p:prevCondLst>
+              <p:nextCondLst>
+                <p:cond evt="onNext" delay="0">
+                  <p:tgtEl>
+                    <p:sldTgt/>
+                  </p:tgtEl>
+                </p:cond>
+              </p:nextCondLst>
+            </p:seq>
+          </p:childTnLst>
+        </p:cTn>
+      </p:par>
+    </p:tnLst>
+    <p:bldLst>
+      <p:bldP spid="7" grpId="0" build="p" bldLvl="3"/>
+    </p:bldLst>
+  </p:timing>
 </p:sld>
 </file>
 

</xml_diff>

<commit_message>
added slide showing how asynchronous methods can run in a synchronous fashion
</commit_message>
<xml_diff>
--- a/ADC Core 2017 - Multithreading and Async Operations in ASP.NET Core.pptx
+++ b/ADC Core 2017 - Multithreading and Async Operations in ASP.NET Core.pptx
@@ -5,10 +5,10 @@
     <p:sldMasterId id="2147483648" r:id="rId1"/>
   </p:sldMasterIdLst>
   <p:notesMasterIdLst>
-    <p:notesMasterId r:id="rId43"/>
+    <p:notesMasterId r:id="rId44"/>
   </p:notesMasterIdLst>
   <p:handoutMasterIdLst>
-    <p:handoutMasterId r:id="rId44"/>
+    <p:handoutMasterId r:id="rId45"/>
   </p:handoutMasterIdLst>
   <p:sldIdLst>
     <p:sldId id="256" r:id="rId2"/>
@@ -46,12 +46,13 @@
     <p:sldId id="294" r:id="rId34"/>
     <p:sldId id="295" r:id="rId35"/>
     <p:sldId id="296" r:id="rId36"/>
-    <p:sldId id="297" r:id="rId37"/>
-    <p:sldId id="298" r:id="rId38"/>
-    <p:sldId id="270" r:id="rId39"/>
-    <p:sldId id="299" r:id="rId40"/>
-    <p:sldId id="258" r:id="rId41"/>
-    <p:sldId id="261" r:id="rId42"/>
+    <p:sldId id="300" r:id="rId37"/>
+    <p:sldId id="297" r:id="rId38"/>
+    <p:sldId id="298" r:id="rId39"/>
+    <p:sldId id="270" r:id="rId40"/>
+    <p:sldId id="299" r:id="rId41"/>
+    <p:sldId id="258" r:id="rId42"/>
+    <p:sldId id="261" r:id="rId43"/>
   </p:sldIdLst>
   <p:sldSz cx="12192000" cy="6858000"/>
   <p:notesSz cx="6858000" cy="9144000"/>
@@ -18186,10 +18187,10 @@
       </p:grpSpPr>
       <p:sp>
         <p:nvSpPr>
-          <p:cNvPr id="9" name="Title 8">
-            <a:extLst>
-              <a:ext uri="{FF2B5EF4-FFF2-40B4-BE49-F238E27FC236}">
-                <a16:creationId xmlns:a16="http://schemas.microsoft.com/office/drawing/2014/main" id="{7510F90B-F441-4BB0-AD9A-CC332541A04B}"/>
+          <p:cNvPr id="2" name="Title 1">
+            <a:extLst>
+              <a:ext uri="{FF2B5EF4-FFF2-40B4-BE49-F238E27FC236}">
+                <a16:creationId xmlns:a16="http://schemas.microsoft.com/office/drawing/2014/main" id="{15A3B8AA-27E5-4979-980F-7D69FA9C7A9F}"/>
               </a:ext>
             </a:extLst>
           </p:cNvPr>
@@ -18197,7 +18198,7 @@
             <a:spLocks noGrp="1"/>
           </p:cNvSpPr>
           <p:nvPr>
-            <p:ph type="ctrTitle"/>
+            <p:ph type="title"/>
           </p:nvPr>
         </p:nvSpPr>
         <p:spPr/>
@@ -18205,28 +18206,23 @@
           <a:bodyPr/>
           <a:lstStyle/>
           <a:p>
-            <a:r>
-              <a:rPr lang="en-US" dirty="0"/>
-              <a:t>Please use </a:t>
-            </a:r>
             <a:r>
               <a:rPr lang="en-US" dirty="0" err="1"/>
               <a:t>Async</a:t>
             </a:r>
             <a:r>
               <a:rPr lang="en-US" dirty="0"/>
-              <a:t> Await</a:t>
-            </a:r>
-            <a:endParaRPr lang="de-DE" dirty="0"/>
-          </a:p>
-        </p:txBody>
-      </p:sp>
-      <p:sp>
-        <p:nvSpPr>
-          <p:cNvPr id="10" name="Subtitle 9">
-            <a:extLst>
-              <a:ext uri="{FF2B5EF4-FFF2-40B4-BE49-F238E27FC236}">
-                <a16:creationId xmlns:a16="http://schemas.microsoft.com/office/drawing/2014/main" id="{684C63F5-C6A7-461B-8C2A-62773D9B0EBF}"/>
+              <a:t> vs. Sync APIs</a:t>
+            </a:r>
+          </a:p>
+        </p:txBody>
+      </p:sp>
+      <p:sp>
+        <p:nvSpPr>
+          <p:cNvPr id="3" name="Content Placeholder 2">
+            <a:extLst>
+              <a:ext uri="{FF2B5EF4-FFF2-40B4-BE49-F238E27FC236}">
+                <a16:creationId xmlns:a16="http://schemas.microsoft.com/office/drawing/2014/main" id="{E549010B-2DBE-43C8-A51F-20630AC5F5BA}"/>
               </a:ext>
             </a:extLst>
           </p:cNvPr>
@@ -18234,7 +18230,7 @@
             <a:spLocks noGrp="1"/>
           </p:cNvSpPr>
           <p:nvPr>
-            <p:ph type="subTitle" idx="1"/>
+            <p:ph sz="quarter" idx="10"/>
           </p:nvPr>
         </p:nvSpPr>
         <p:spPr/>
@@ -18243,10 +18239,116 @@
           <a:lstStyle/>
           <a:p>
             <a:r>
-              <a:rPr lang="en-US" sz="3200" dirty="0"/>
-              <a:t>Your ASP.NET Core Apps will scale way better.</a:t>
-            </a:r>
-            <a:endParaRPr lang="de-DE" sz="3200" dirty="0"/>
+              <a:rPr lang="en-US" dirty="0"/>
+              <a:t>An asynchronous API looks different than a synchronous one.</a:t>
+            </a:r>
+          </a:p>
+          <a:p>
+            <a:r>
+              <a:rPr lang="en-US" dirty="0"/>
+              <a:t>Asynchronous methods can execute synchronously but the other way is not possible.</a:t>
+            </a:r>
+          </a:p>
+          <a:p>
+            <a:pPr marL="0" indent="0">
+              <a:buNone/>
+            </a:pPr>
+            <a:endParaRPr lang="en-US" sz="1800" dirty="0"/>
+          </a:p>
+          <a:p>
+            <a:pPr marL="0" indent="0">
+              <a:buNone/>
+            </a:pPr>
+            <a:r>
+              <a:rPr lang="en-US" sz="2800" noProof="1">
+                <a:solidFill>
+                  <a:srgbClr val="0000FF"/>
+                </a:solidFill>
+              </a:rPr>
+              <a:t>public async</a:t>
+            </a:r>
+            <a:r>
+              <a:rPr lang="en-US" sz="2800" noProof="1"/>
+              <a:t> </a:t>
+            </a:r>
+            <a:r>
+              <a:rPr lang="en-US" sz="2800" noProof="1">
+                <a:solidFill>
+                  <a:srgbClr val="2D91AF"/>
+                </a:solidFill>
+              </a:rPr>
+              <a:t>Task</a:t>
+            </a:r>
+            <a:r>
+              <a:rPr lang="en-US" sz="2800" noProof="1"/>
+              <a:t> DoSomethingAsync()</a:t>
+            </a:r>
+            <a:br>
+              <a:rPr lang="en-US" sz="2800" noProof="1"/>
+            </a:br>
+            <a:r>
+              <a:rPr lang="en-US" sz="2800" noProof="1"/>
+              <a:t>{</a:t>
+            </a:r>
+            <a:br>
+              <a:rPr lang="en-US" sz="2800" noProof="1"/>
+            </a:br>
+            <a:r>
+              <a:rPr lang="en-US" sz="2800" noProof="1"/>
+              <a:t>    </a:t>
+            </a:r>
+            <a:r>
+              <a:rPr lang="en-US" sz="2800" noProof="1">
+                <a:solidFill>
+                  <a:srgbClr val="008000"/>
+                </a:solidFill>
+              </a:rPr>
+              <a:t>// Calculate something synchronously here</a:t>
+            </a:r>
+            <a:br>
+              <a:rPr lang="en-US" sz="2800" noProof="1"/>
+            </a:br>
+            <a:r>
+              <a:rPr lang="en-US" sz="2800" noProof="1"/>
+              <a:t>    </a:t>
+            </a:r>
+            <a:r>
+              <a:rPr lang="en-US" sz="2800" noProof="1">
+                <a:solidFill>
+                  <a:srgbClr val="0000FF"/>
+                </a:solidFill>
+              </a:rPr>
+              <a:t>return</a:t>
+            </a:r>
+            <a:r>
+              <a:rPr lang="en-US" sz="2800" noProof="1"/>
+              <a:t> </a:t>
+            </a:r>
+            <a:r>
+              <a:rPr lang="en-US" sz="2800" noProof="1">
+                <a:solidFill>
+                  <a:srgbClr val="2D91AF"/>
+                </a:solidFill>
+              </a:rPr>
+              <a:t>Task</a:t>
+            </a:r>
+            <a:r>
+              <a:rPr lang="en-US" sz="2800" noProof="1"/>
+              <a:t>.CompletedTask;</a:t>
+            </a:r>
+            <a:br>
+              <a:rPr lang="en-US" sz="2800" noProof="1"/>
+            </a:br>
+            <a:r>
+              <a:rPr lang="en-US" sz="2800" noProof="1"/>
+              <a:t>}</a:t>
+            </a:r>
+          </a:p>
+          <a:p>
+            <a:pPr marL="0" indent="0">
+              <a:buNone/>
+            </a:pPr>
+            <a:endParaRPr lang="en-US" dirty="0"/>
           </a:p>
         </p:txBody>
       </p:sp>
@@ -18255,7 +18357,7 @@
           <p:cNvPr id="4" name="Date Placeholder 3">
             <a:extLst>
               <a:ext uri="{FF2B5EF4-FFF2-40B4-BE49-F238E27FC236}">
-                <a16:creationId xmlns:a16="http://schemas.microsoft.com/office/drawing/2014/main" id="{251366A7-DEC9-4345-BEF9-F213FC2A7847}"/>
+                <a16:creationId xmlns:a16="http://schemas.microsoft.com/office/drawing/2014/main" id="{FE0B5FC0-BAA4-47DC-8D25-246F6831F334}"/>
               </a:ext>
             </a:extLst>
           </p:cNvPr>
@@ -18263,18 +18365,10 @@
             <a:spLocks noGrp="1"/>
           </p:cNvSpPr>
           <p:nvPr>
-            <p:ph type="dt" sz="half" idx="4294967295"/>
+            <p:ph type="dt" sz="half" idx="11"/>
           </p:nvPr>
         </p:nvSpPr>
-        <p:spPr>
-          <a:xfrm>
-            <a:off x="0" y="6524625"/>
-            <a:ext cx="2743200" cy="196850"/>
-          </a:xfrm>
-          <a:prstGeom prst="rect">
-            <a:avLst/>
-          </a:prstGeom>
-        </p:spPr>
+        <p:spPr/>
         <p:txBody>
           <a:bodyPr/>
           <a:lstStyle/>
@@ -18291,7 +18385,7 @@
           <p:cNvPr id="5" name="Slide Number Placeholder 4">
             <a:extLst>
               <a:ext uri="{FF2B5EF4-FFF2-40B4-BE49-F238E27FC236}">
-                <a16:creationId xmlns:a16="http://schemas.microsoft.com/office/drawing/2014/main" id="{BF148ECE-9E9D-4302-9B57-C590EADFF8CC}"/>
+                <a16:creationId xmlns:a16="http://schemas.microsoft.com/office/drawing/2014/main" id="{3D4D2A3C-2FA1-44BF-A744-44EE6D1AC504}"/>
               </a:ext>
             </a:extLst>
           </p:cNvPr>
@@ -18299,18 +18393,10 @@
             <a:spLocks noGrp="1"/>
           </p:cNvSpPr>
           <p:nvPr>
-            <p:ph type="sldNum" sz="quarter" idx="4294967295"/>
+            <p:ph type="sldNum" sz="quarter" idx="13"/>
           </p:nvPr>
         </p:nvSpPr>
-        <p:spPr>
-          <a:xfrm>
-            <a:off x="9448800" y="6524625"/>
-            <a:ext cx="2743200" cy="196850"/>
-          </a:xfrm>
-          <a:prstGeom prst="rect">
-            <a:avLst/>
-          </a:prstGeom>
-        </p:spPr>
+        <p:spPr/>
         <p:txBody>
           <a:bodyPr/>
           <a:lstStyle/>
@@ -18327,7 +18413,7 @@
     </p:spTree>
     <p:extLst>
       <p:ext uri="{BB962C8B-B14F-4D97-AF65-F5344CB8AC3E}">
-        <p14:creationId xmlns:p14="http://schemas.microsoft.com/office/powerpoint/2010/main" val="1645117500"/>
+        <p14:creationId xmlns:p14="http://schemas.microsoft.com/office/powerpoint/2010/main" val="2803316676"/>
       </p:ext>
     </p:extLst>
   </p:cSld>
@@ -18359,10 +18445,10 @@
       </p:grpSpPr>
       <p:sp>
         <p:nvSpPr>
-          <p:cNvPr id="6" name="Title 5">
-            <a:extLst>
-              <a:ext uri="{FF2B5EF4-FFF2-40B4-BE49-F238E27FC236}">
-                <a16:creationId xmlns:a16="http://schemas.microsoft.com/office/drawing/2014/main" id="{B8781E9B-0100-4568-86D4-8EDD5ED94D28}"/>
+          <p:cNvPr id="9" name="Title 8">
+            <a:extLst>
+              <a:ext uri="{FF2B5EF4-FFF2-40B4-BE49-F238E27FC236}">
+                <a16:creationId xmlns:a16="http://schemas.microsoft.com/office/drawing/2014/main" id="{7510F90B-F441-4BB0-AD9A-CC332541A04B}"/>
               </a:ext>
             </a:extLst>
           </p:cNvPr>
@@ -18370,22 +18456,32 @@
             <a:spLocks noGrp="1"/>
           </p:cNvSpPr>
           <p:nvPr>
-            <p:ph type="title"/>
+            <p:ph type="ctrTitle"/>
           </p:nvPr>
         </p:nvSpPr>
-        <p:spPr>
-          <a:xfrm>
-            <a:off x="838200" y="735285"/>
-            <a:ext cx="10515600" cy="1325563"/>
-          </a:xfrm>
-        </p:spPr>
+        <p:spPr/>
         <p:txBody>
           <a:bodyPr/>
           <a:lstStyle/>
           <a:p>
             <a:r>
-              <a:rPr lang="en-US" dirty="0"/>
-              <a:t>Sources</a:t>
+              <a:rPr lang="en-US" sz="4800" dirty="0"/>
+              <a:t>Please use </a:t>
+            </a:r>
+            <a:r>
+              <a:rPr lang="en-US" sz="4800" dirty="0" err="1"/>
+              <a:t>Async</a:t>
+            </a:r>
+            <a:r>
+              <a:rPr lang="en-US" sz="4800" dirty="0"/>
+              <a:t> Await</a:t>
+            </a:r>
+            <a:br>
+              <a:rPr lang="en-US" sz="4800" dirty="0"/>
+            </a:br>
+            <a:r>
+              <a:rPr lang="en-US" sz="4800" dirty="0"/>
+              <a:t>when accessing external systems</a:t>
             </a:r>
             <a:endParaRPr lang="de-DE" dirty="0"/>
           </a:p>
@@ -18393,10 +18489,10 @@
       </p:sp>
       <p:sp>
         <p:nvSpPr>
-          <p:cNvPr id="7" name="Content Placeholder 6">
-            <a:extLst>
-              <a:ext uri="{FF2B5EF4-FFF2-40B4-BE49-F238E27FC236}">
-                <a16:creationId xmlns:a16="http://schemas.microsoft.com/office/drawing/2014/main" id="{7E98D094-E68E-439B-8A7B-4605B4898DFD}"/>
+          <p:cNvPr id="10" name="Subtitle 9">
+            <a:extLst>
+              <a:ext uri="{FF2B5EF4-FFF2-40B4-BE49-F238E27FC236}">
+                <a16:creationId xmlns:a16="http://schemas.microsoft.com/office/drawing/2014/main" id="{684C63F5-C6A7-461B-8C2A-62773D9B0EBF}"/>
               </a:ext>
             </a:extLst>
           </p:cNvPr>
@@ -18404,7 +18500,7 @@
             <a:spLocks noGrp="1"/>
           </p:cNvSpPr>
           <p:nvPr>
-            <p:ph idx="1"/>
+            <p:ph type="subTitle" idx="1"/>
           </p:nvPr>
         </p:nvSpPr>
         <p:spPr/>
@@ -18413,125 +18509,91 @@
           <a:lstStyle/>
           <a:p>
             <a:r>
-              <a:rPr lang="de-DE" dirty="0"/>
-              <a:t>Jeffrey Richter – </a:t>
-            </a:r>
-            <a:r>
-              <a:rPr lang="de-DE" dirty="0" err="1"/>
-              <a:t>Advanced</a:t>
-            </a:r>
-            <a:r>
-              <a:rPr lang="de-DE" dirty="0"/>
-              <a:t> .NET Threading:</a:t>
-            </a:r>
-            <a:br>
-              <a:rPr lang="de-DE" dirty="0"/>
-            </a:br>
-            <a:r>
-              <a:rPr lang="de-DE" dirty="0">
-                <a:hlinkClick r:id="rId2"/>
-              </a:rPr>
-              <a:t>Part 1</a:t>
-            </a:r>
-            <a:r>
-              <a:rPr lang="de-DE" dirty="0"/>
-              <a:t> </a:t>
-            </a:r>
-            <a:r>
-              <a:rPr lang="de-DE" dirty="0">
-                <a:hlinkClick r:id="rId3"/>
-              </a:rPr>
-              <a:t>Part 2</a:t>
-            </a:r>
-            <a:r>
-              <a:rPr lang="de-DE" dirty="0"/>
-              <a:t> </a:t>
-            </a:r>
-            <a:r>
-              <a:rPr lang="de-DE" dirty="0">
-                <a:hlinkClick r:id="rId4"/>
-              </a:rPr>
-              <a:t>Part 3</a:t>
-            </a:r>
-            <a:r>
-              <a:rPr lang="de-DE" dirty="0"/>
-              <a:t> </a:t>
-            </a:r>
-            <a:r>
-              <a:rPr lang="de-DE" dirty="0">
-                <a:hlinkClick r:id="rId5"/>
-              </a:rPr>
-              <a:t>Part 4</a:t>
-            </a:r>
-            <a:r>
-              <a:rPr lang="de-DE" dirty="0"/>
-              <a:t> </a:t>
-            </a:r>
-            <a:r>
-              <a:rPr lang="de-DE" dirty="0">
-                <a:hlinkClick r:id="rId6"/>
-              </a:rPr>
-              <a:t>Part 5</a:t>
-            </a:r>
-            <a:endParaRPr lang="de-DE" dirty="0"/>
-          </a:p>
-          <a:p>
-            <a:r>
-              <a:rPr lang="de-DE" dirty="0"/>
-              <a:t>Joseph </a:t>
-            </a:r>
-            <a:r>
-              <a:rPr lang="de-DE" dirty="0" err="1"/>
-              <a:t>Albahari</a:t>
-            </a:r>
-            <a:r>
-              <a:rPr lang="de-DE" dirty="0"/>
-              <a:t> – Threading in .NET</a:t>
-            </a:r>
-            <a:br>
-              <a:rPr lang="de-DE" dirty="0"/>
-            </a:br>
-            <a:r>
-              <a:rPr lang="de-DE" dirty="0">
-                <a:hlinkClick r:id="rId7"/>
-              </a:rPr>
-              <a:t>http://www.albahari.com/threading/</a:t>
-            </a:r>
-            <a:endParaRPr lang="de-DE" dirty="0"/>
-          </a:p>
-          <a:p>
-            <a:r>
-              <a:rPr lang="de-DE" dirty="0"/>
-              <a:t>Jon Skeet – </a:t>
-            </a:r>
-            <a:r>
-              <a:rPr lang="de-DE" dirty="0" err="1"/>
-              <a:t>Asynchronous</a:t>
-            </a:r>
-            <a:r>
-              <a:rPr lang="de-DE" dirty="0"/>
-              <a:t> C# 5.0</a:t>
-            </a:r>
-            <a:br>
-              <a:rPr lang="de-DE" dirty="0"/>
-            </a:br>
-            <a:r>
-              <a:rPr lang="en-GB" u="sng" dirty="0">
-                <a:hlinkClick r:id="rId8"/>
-              </a:rPr>
-              <a:t>Pluralsight Course on Asynchronous C# 5.0</a:t>
-            </a:r>
-            <a:endParaRPr lang="en-GB" u="sng" dirty="0"/>
-          </a:p>
-          <a:p>
-            <a:endParaRPr lang="de-DE" dirty="0"/>
+              <a:rPr lang="en-US" sz="3200" dirty="0"/>
+              <a:t>Your ASP.NET Core Apps will scale way better.</a:t>
+            </a:r>
+            <a:endParaRPr lang="de-DE" sz="3200" dirty="0"/>
+          </a:p>
+        </p:txBody>
+      </p:sp>
+      <p:sp>
+        <p:nvSpPr>
+          <p:cNvPr id="4" name="Date Placeholder 3">
+            <a:extLst>
+              <a:ext uri="{FF2B5EF4-FFF2-40B4-BE49-F238E27FC236}">
+                <a16:creationId xmlns:a16="http://schemas.microsoft.com/office/drawing/2014/main" id="{251366A7-DEC9-4345-BEF9-F213FC2A7847}"/>
+              </a:ext>
+            </a:extLst>
+          </p:cNvPr>
+          <p:cNvSpPr>
+            <a:spLocks noGrp="1"/>
+          </p:cNvSpPr>
+          <p:nvPr>
+            <p:ph type="dt" sz="half" idx="4294967295"/>
+          </p:nvPr>
+        </p:nvSpPr>
+        <p:spPr>
+          <a:xfrm>
+            <a:off x="0" y="6524625"/>
+            <a:ext cx="2743200" cy="196850"/>
+          </a:xfrm>
+          <a:prstGeom prst="rect">
+            <a:avLst/>
+          </a:prstGeom>
+        </p:spPr>
+        <p:txBody>
+          <a:bodyPr/>
+          <a:lstStyle/>
+          <a:p>
+            <a:r>
+              <a:rPr lang="de-DE"/>
+              <a:t>18.09.2017</a:t>
+            </a:r>
+          </a:p>
+        </p:txBody>
+      </p:sp>
+      <p:sp>
+        <p:nvSpPr>
+          <p:cNvPr id="5" name="Slide Number Placeholder 4">
+            <a:extLst>
+              <a:ext uri="{FF2B5EF4-FFF2-40B4-BE49-F238E27FC236}">
+                <a16:creationId xmlns:a16="http://schemas.microsoft.com/office/drawing/2014/main" id="{BF148ECE-9E9D-4302-9B57-C590EADFF8CC}"/>
+              </a:ext>
+            </a:extLst>
+          </p:cNvPr>
+          <p:cNvSpPr>
+            <a:spLocks noGrp="1"/>
+          </p:cNvSpPr>
+          <p:nvPr>
+            <p:ph type="sldNum" sz="quarter" idx="4294967295"/>
+          </p:nvPr>
+        </p:nvSpPr>
+        <p:spPr>
+          <a:xfrm>
+            <a:off x="9448800" y="6524625"/>
+            <a:ext cx="2743200" cy="196850"/>
+          </a:xfrm>
+          <a:prstGeom prst="rect">
+            <a:avLst/>
+          </a:prstGeom>
+        </p:spPr>
+        <p:txBody>
+          <a:bodyPr/>
+          <a:lstStyle/>
+          <a:p>
+            <a:fld id="{3AA5FB2A-BCB4-4E64-AAE1-BAC1A8A5655D}" type="slidenum">
+              <a:rPr lang="de-DE" smtClean="0"/>
+              <a:pPr/>
+              <a:t>37</a:t>
+            </a:fld>
+            <a:endParaRPr lang="de-DE"/>
           </a:p>
         </p:txBody>
       </p:sp>
     </p:spTree>
     <p:extLst>
       <p:ext uri="{BB962C8B-B14F-4D97-AF65-F5344CB8AC3E}">
-        <p14:creationId xmlns:p14="http://schemas.microsoft.com/office/powerpoint/2010/main" val="3934572435"/>
+        <p14:creationId xmlns:p14="http://schemas.microsoft.com/office/powerpoint/2010/main" val="1645117500"/>
       </p:ext>
     </p:extLst>
   </p:cSld>
@@ -18563,10 +18625,10 @@
       </p:grpSpPr>
       <p:sp>
         <p:nvSpPr>
-          <p:cNvPr id="5" name="Title 4">
-            <a:extLst>
-              <a:ext uri="{FF2B5EF4-FFF2-40B4-BE49-F238E27FC236}">
-                <a16:creationId xmlns:a16="http://schemas.microsoft.com/office/drawing/2014/main" id="{5B9B83E1-5259-47E1-9C93-379502F2FA2D}"/>
+          <p:cNvPr id="6" name="Title 5">
+            <a:extLst>
+              <a:ext uri="{FF2B5EF4-FFF2-40B4-BE49-F238E27FC236}">
+                <a16:creationId xmlns:a16="http://schemas.microsoft.com/office/drawing/2014/main" id="{B8781E9B-0100-4568-86D4-8EDD5ED94D28}"/>
               </a:ext>
             </a:extLst>
           </p:cNvPr>
@@ -18589,7 +18651,7 @@
           <a:p>
             <a:r>
               <a:rPr lang="en-US" dirty="0"/>
-              <a:t>Image Contributions</a:t>
+              <a:t>Sources</a:t>
             </a:r>
             <a:endParaRPr lang="de-DE" dirty="0"/>
           </a:p>
@@ -18597,10 +18659,10 @@
       </p:sp>
       <p:sp>
         <p:nvSpPr>
-          <p:cNvPr id="6" name="Content Placeholder 5">
-            <a:extLst>
-              <a:ext uri="{FF2B5EF4-FFF2-40B4-BE49-F238E27FC236}">
-                <a16:creationId xmlns:a16="http://schemas.microsoft.com/office/drawing/2014/main" id="{8533A17D-A73E-41BD-B23C-CD84AF992947}"/>
+          <p:cNvPr id="7" name="Content Placeholder 6">
+            <a:extLst>
+              <a:ext uri="{FF2B5EF4-FFF2-40B4-BE49-F238E27FC236}">
+                <a16:creationId xmlns:a16="http://schemas.microsoft.com/office/drawing/2014/main" id="{7E98D094-E68E-439B-8A7B-4605B4898DFD}"/>
               </a:ext>
             </a:extLst>
           </p:cNvPr>
@@ -18617,37 +18679,115 @@
           <a:lstStyle/>
           <a:p>
             <a:r>
-              <a:rPr lang="en-US" dirty="0"/>
-              <a:t>CPUs: </a:t>
-            </a:r>
-            <a:r>
-              <a:rPr lang="en-US" dirty="0">
+              <a:rPr lang="de-DE" dirty="0"/>
+              <a:t>Jeffrey Richter – </a:t>
+            </a:r>
+            <a:r>
+              <a:rPr lang="de-DE" dirty="0" err="1"/>
+              <a:t>Advanced</a:t>
+            </a:r>
+            <a:r>
+              <a:rPr lang="de-DE" dirty="0"/>
+              <a:t> .NET Threading:</a:t>
+            </a:r>
+            <a:br>
+              <a:rPr lang="de-DE" dirty="0"/>
+            </a:br>
+            <a:r>
+              <a:rPr lang="de-DE" dirty="0">
                 <a:hlinkClick r:id="rId2"/>
               </a:rPr>
-              <a:t>https://namu.wiki/w/CPU</a:t>
-            </a:r>
-            <a:endParaRPr lang="en-US" dirty="0"/>
-          </a:p>
-          <a:p>
-            <a:r>
-              <a:rPr lang="en-US" dirty="0"/>
-              <a:t>Ball of Wool: Tim </a:t>
-            </a:r>
-            <a:r>
-              <a:rPr lang="en-US" dirty="0" err="1"/>
-              <a:t>Reckmann</a:t>
-            </a:r>
-            <a:r>
-              <a:rPr lang="en-US" dirty="0"/>
+              <a:t>Part 1</a:t>
+            </a:r>
+            <a:r>
+              <a:rPr lang="de-DE" dirty="0"/>
               <a:t> </a:t>
             </a:r>
             <a:r>
-              <a:rPr lang="en-US" dirty="0">
+              <a:rPr lang="de-DE" dirty="0">
                 <a:hlinkClick r:id="rId3"/>
               </a:rPr>
-              <a:t>https://www.flickr.com/photos/foto_db/16252248370</a:t>
-            </a:r>
-            <a:endParaRPr lang="en-US" dirty="0"/>
+              <a:t>Part 2</a:t>
+            </a:r>
+            <a:r>
+              <a:rPr lang="de-DE" dirty="0"/>
+              <a:t> </a:t>
+            </a:r>
+            <a:r>
+              <a:rPr lang="de-DE" dirty="0">
+                <a:hlinkClick r:id="rId4"/>
+              </a:rPr>
+              <a:t>Part 3</a:t>
+            </a:r>
+            <a:r>
+              <a:rPr lang="de-DE" dirty="0"/>
+              <a:t> </a:t>
+            </a:r>
+            <a:r>
+              <a:rPr lang="de-DE" dirty="0">
+                <a:hlinkClick r:id="rId5"/>
+              </a:rPr>
+              <a:t>Part 4</a:t>
+            </a:r>
+            <a:r>
+              <a:rPr lang="de-DE" dirty="0"/>
+              <a:t> </a:t>
+            </a:r>
+            <a:r>
+              <a:rPr lang="de-DE" dirty="0">
+                <a:hlinkClick r:id="rId6"/>
+              </a:rPr>
+              <a:t>Part 5</a:t>
+            </a:r>
+            <a:endParaRPr lang="de-DE" dirty="0"/>
+          </a:p>
+          <a:p>
+            <a:r>
+              <a:rPr lang="de-DE" dirty="0"/>
+              <a:t>Joseph </a:t>
+            </a:r>
+            <a:r>
+              <a:rPr lang="de-DE" dirty="0" err="1"/>
+              <a:t>Albahari</a:t>
+            </a:r>
+            <a:r>
+              <a:rPr lang="de-DE" dirty="0"/>
+              <a:t> – Threading in .NET</a:t>
+            </a:r>
+            <a:br>
+              <a:rPr lang="de-DE" dirty="0"/>
+            </a:br>
+            <a:r>
+              <a:rPr lang="de-DE" dirty="0">
+                <a:hlinkClick r:id="rId7"/>
+              </a:rPr>
+              <a:t>http://www.albahari.com/threading/</a:t>
+            </a:r>
+            <a:endParaRPr lang="de-DE" dirty="0"/>
+          </a:p>
+          <a:p>
+            <a:r>
+              <a:rPr lang="de-DE" dirty="0"/>
+              <a:t>Jon Skeet – </a:t>
+            </a:r>
+            <a:r>
+              <a:rPr lang="de-DE" dirty="0" err="1"/>
+              <a:t>Asynchronous</a:t>
+            </a:r>
+            <a:r>
+              <a:rPr lang="de-DE" dirty="0"/>
+              <a:t> C# 5.0</a:t>
+            </a:r>
+            <a:br>
+              <a:rPr lang="de-DE" dirty="0"/>
+            </a:br>
+            <a:r>
+              <a:rPr lang="en-GB" u="sng" dirty="0">
+                <a:hlinkClick r:id="rId8"/>
+              </a:rPr>
+              <a:t>Pluralsight Course on Asynchronous C# 5.0</a:t>
+            </a:r>
+            <a:endParaRPr lang="en-GB" u="sng" dirty="0"/>
           </a:p>
           <a:p>
             <a:endParaRPr lang="de-DE" dirty="0"/>
@@ -18657,7 +18797,7 @@
     </p:spTree>
     <p:extLst>
       <p:ext uri="{BB962C8B-B14F-4D97-AF65-F5344CB8AC3E}">
-        <p14:creationId xmlns:p14="http://schemas.microsoft.com/office/powerpoint/2010/main" val="3335817011"/>
+        <p14:creationId xmlns:p14="http://schemas.microsoft.com/office/powerpoint/2010/main" val="3934572435"/>
       </p:ext>
     </p:extLst>
   </p:cSld>
@@ -18689,10 +18829,10 @@
       </p:grpSpPr>
       <p:sp>
         <p:nvSpPr>
-          <p:cNvPr id="2" name="Title 1">
-            <a:extLst>
-              <a:ext uri="{FF2B5EF4-FFF2-40B4-BE49-F238E27FC236}">
-                <a16:creationId xmlns:a16="http://schemas.microsoft.com/office/drawing/2014/main" id="{3B2C9EE8-6EF3-4E74-9FCF-4A1ACD9C55DB}"/>
+          <p:cNvPr id="5" name="Title 4">
+            <a:extLst>
+              <a:ext uri="{FF2B5EF4-FFF2-40B4-BE49-F238E27FC236}">
+                <a16:creationId xmlns:a16="http://schemas.microsoft.com/office/drawing/2014/main" id="{5B9B83E1-5259-47E1-9C93-379502F2FA2D}"/>
               </a:ext>
             </a:extLst>
           </p:cNvPr>
@@ -18715,7 +18855,7 @@
           <a:p>
             <a:r>
               <a:rPr lang="en-US" dirty="0"/>
-              <a:t>Revisit!</a:t>
+              <a:t>Image Contributions</a:t>
             </a:r>
             <a:endParaRPr lang="de-DE" dirty="0"/>
           </a:p>
@@ -18723,10 +18863,10 @@
       </p:sp>
       <p:sp>
         <p:nvSpPr>
-          <p:cNvPr id="3" name="Content Placeholder 2">
-            <a:extLst>
-              <a:ext uri="{FF2B5EF4-FFF2-40B4-BE49-F238E27FC236}">
-                <a16:creationId xmlns:a16="http://schemas.microsoft.com/office/drawing/2014/main" id="{7C2CDA81-14BB-49C4-AA27-DA6F02A560A7}"/>
+          <p:cNvPr id="6" name="Content Placeholder 5">
+            <a:extLst>
+              <a:ext uri="{FF2B5EF4-FFF2-40B4-BE49-F238E27FC236}">
+                <a16:creationId xmlns:a16="http://schemas.microsoft.com/office/drawing/2014/main" id="{8533A17D-A73E-41BD-B23C-CD84AF992947}"/>
               </a:ext>
             </a:extLst>
           </p:cNvPr>
@@ -18742,32 +18882,48 @@
           <a:bodyPr/>
           <a:lstStyle/>
           <a:p>
-            <a:pPr marL="0" indent="0" algn="ctr">
-              <a:buNone/>
-            </a:pPr>
             <a:r>
               <a:rPr lang="en-US" dirty="0"/>
-              <a:t>The slides and source code are available at:</a:t>
-            </a:r>
-          </a:p>
-          <a:p>
-            <a:pPr marL="0" indent="0" algn="ctr">
-              <a:buNone/>
-            </a:pPr>
-            <a:r>
-              <a:rPr lang="en-US" sz="2800" dirty="0">
+              <a:t>CPUs: </a:t>
+            </a:r>
+            <a:r>
+              <a:rPr lang="en-US" dirty="0">
                 <a:hlinkClick r:id="rId2"/>
               </a:rPr>
-              <a:t>https://github.com/feO2x/AdcCore2017.MultithreadingAndAsync</a:t>
-            </a:r>
-            <a:endParaRPr lang="de-DE" sz="2800" dirty="0"/>
+              <a:t>https://namu.wiki/w/CPU</a:t>
+            </a:r>
+            <a:endParaRPr lang="en-US" dirty="0"/>
+          </a:p>
+          <a:p>
+            <a:r>
+              <a:rPr lang="en-US" dirty="0"/>
+              <a:t>Ball of Wool: Tim </a:t>
+            </a:r>
+            <a:r>
+              <a:rPr lang="en-US" dirty="0" err="1"/>
+              <a:t>Reckmann</a:t>
+            </a:r>
+            <a:r>
+              <a:rPr lang="en-US" dirty="0"/>
+              <a:t> </a:t>
+            </a:r>
+            <a:r>
+              <a:rPr lang="en-US" dirty="0">
+                <a:hlinkClick r:id="rId3"/>
+              </a:rPr>
+              <a:t>https://www.flickr.com/photos/foto_db/16252248370</a:t>
+            </a:r>
+            <a:endParaRPr lang="en-US" dirty="0"/>
+          </a:p>
+          <a:p>
+            <a:endParaRPr lang="de-DE" dirty="0"/>
           </a:p>
         </p:txBody>
       </p:sp>
     </p:spTree>
     <p:extLst>
       <p:ext uri="{BB962C8B-B14F-4D97-AF65-F5344CB8AC3E}">
-        <p14:creationId xmlns:p14="http://schemas.microsoft.com/office/powerpoint/2010/main" val="575733322"/>
+        <p14:creationId xmlns:p14="http://schemas.microsoft.com/office/powerpoint/2010/main" val="3335817011"/>
       </p:ext>
     </p:extLst>
   </p:cSld>
@@ -18886,6 +19042,116 @@
       </p:grpSpPr>
       <p:sp>
         <p:nvSpPr>
+          <p:cNvPr id="2" name="Title 1">
+            <a:extLst>
+              <a:ext uri="{FF2B5EF4-FFF2-40B4-BE49-F238E27FC236}">
+                <a16:creationId xmlns:a16="http://schemas.microsoft.com/office/drawing/2014/main" id="{3B2C9EE8-6EF3-4E74-9FCF-4A1ACD9C55DB}"/>
+              </a:ext>
+            </a:extLst>
+          </p:cNvPr>
+          <p:cNvSpPr>
+            <a:spLocks noGrp="1"/>
+          </p:cNvSpPr>
+          <p:nvPr>
+            <p:ph type="title"/>
+          </p:nvPr>
+        </p:nvSpPr>
+        <p:spPr>
+          <a:xfrm>
+            <a:off x="838200" y="735285"/>
+            <a:ext cx="10515600" cy="1325563"/>
+          </a:xfrm>
+        </p:spPr>
+        <p:txBody>
+          <a:bodyPr/>
+          <a:lstStyle/>
+          <a:p>
+            <a:r>
+              <a:rPr lang="en-US" dirty="0"/>
+              <a:t>Revisit!</a:t>
+            </a:r>
+            <a:endParaRPr lang="de-DE" dirty="0"/>
+          </a:p>
+        </p:txBody>
+      </p:sp>
+      <p:sp>
+        <p:nvSpPr>
+          <p:cNvPr id="3" name="Content Placeholder 2">
+            <a:extLst>
+              <a:ext uri="{FF2B5EF4-FFF2-40B4-BE49-F238E27FC236}">
+                <a16:creationId xmlns:a16="http://schemas.microsoft.com/office/drawing/2014/main" id="{7C2CDA81-14BB-49C4-AA27-DA6F02A560A7}"/>
+              </a:ext>
+            </a:extLst>
+          </p:cNvPr>
+          <p:cNvSpPr>
+            <a:spLocks noGrp="1"/>
+          </p:cNvSpPr>
+          <p:nvPr>
+            <p:ph idx="1"/>
+          </p:nvPr>
+        </p:nvSpPr>
+        <p:spPr/>
+        <p:txBody>
+          <a:bodyPr/>
+          <a:lstStyle/>
+          <a:p>
+            <a:pPr marL="0" indent="0" algn="ctr">
+              <a:buNone/>
+            </a:pPr>
+            <a:r>
+              <a:rPr lang="en-US" dirty="0"/>
+              <a:t>The slides and source code are available at:</a:t>
+            </a:r>
+          </a:p>
+          <a:p>
+            <a:pPr marL="0" indent="0" algn="ctr">
+              <a:buNone/>
+            </a:pPr>
+            <a:r>
+              <a:rPr lang="en-US" sz="2800" dirty="0">
+                <a:hlinkClick r:id="rId2"/>
+              </a:rPr>
+              <a:t>https://github.com/feO2x/AdcCore2017.MultithreadingAndAsync</a:t>
+            </a:r>
+            <a:endParaRPr lang="de-DE" sz="2800" dirty="0"/>
+          </a:p>
+        </p:txBody>
+      </p:sp>
+    </p:spTree>
+    <p:extLst>
+      <p:ext uri="{BB962C8B-B14F-4D97-AF65-F5344CB8AC3E}">
+        <p14:creationId xmlns:p14="http://schemas.microsoft.com/office/powerpoint/2010/main" val="575733322"/>
+      </p:ext>
+    </p:extLst>
+  </p:cSld>
+  <p:clrMapOvr>
+    <a:masterClrMapping/>
+  </p:clrMapOvr>
+  <p:transition spd="med">
+    <p:pull/>
+  </p:transition>
+</p:sld>
+</file>
+
+<file path=ppt/slides/slide41.xml><?xml version="1.0" encoding="utf-8"?>
+<p:sld xmlns:a="http://schemas.openxmlformats.org/drawingml/2006/main" xmlns:r="http://schemas.openxmlformats.org/officeDocument/2006/relationships" xmlns:p="http://schemas.openxmlformats.org/presentationml/2006/main">
+  <p:cSld>
+    <p:spTree>
+      <p:nvGrpSpPr>
+        <p:cNvPr id="1" name=""/>
+        <p:cNvGrpSpPr/>
+        <p:nvPr/>
+      </p:nvGrpSpPr>
+      <p:grpSpPr>
+        <a:xfrm>
+          <a:off x="0" y="0"/>
+          <a:ext cx="0" cy="0"/>
+          <a:chOff x="0" y="0"/>
+          <a:chExt cx="0" cy="0"/>
+        </a:xfrm>
+      </p:grpSpPr>
+      <p:sp>
+        <p:nvSpPr>
           <p:cNvPr id="6146" name="Titel 3"/>
           <p:cNvSpPr>
             <a:spLocks noGrp="1"/>
@@ -18950,7 +19216,7 @@
 </p:sld>
 </file>
 
-<file path=ppt/slides/slide41.xml><?xml version="1.0" encoding="utf-8"?>
+<file path=ppt/slides/slide42.xml><?xml version="1.0" encoding="utf-8"?>
 <p:sld xmlns:a="http://schemas.openxmlformats.org/drawingml/2006/main" xmlns:r="http://schemas.openxmlformats.org/officeDocument/2006/relationships" xmlns:p="http://schemas.openxmlformats.org/presentationml/2006/main">
   <p:cSld>
     <p:spTree>

</xml_diff>

<commit_message>
rename flow-of-control to control flow
</commit_message>
<xml_diff>
--- a/ADC Core 2017 - Multithreading and Async Operations in ASP.NET Core.pptx
+++ b/ADC Core 2017 - Multithreading and Async Operations in ASP.NET Core.pptx
@@ -13398,7 +13398,7 @@
           <a:p>
             <a:r>
               <a:rPr lang="en-US" dirty="0"/>
-              <a:t>The Flow-Of-Control is altered – methods can return when an await statement is executed</a:t>
+              <a:t>The control flow is altered – methods can return when an await statement is executed</a:t>
             </a:r>
           </a:p>
           <a:p>
@@ -19477,15 +19477,7 @@
             <a:pPr lvl="1"/>
             <a:r>
               <a:rPr lang="en-US" dirty="0"/>
-              <a:t>12KB (</a:t>
-            </a:r>
-            <a:r>
-              <a:rPr lang="en-US"/>
-              <a:t>x86) or 14 </a:t>
-            </a:r>
-            <a:r>
-              <a:rPr lang="en-US" dirty="0"/>
-              <a:t>KB (x64) Kernel Mode Object</a:t>
+              <a:t>12KB (x86) or 14 KB (x64) Kernel Mode Object</a:t>
             </a:r>
           </a:p>
           <a:p>

</xml_diff>